<commit_message>
rettet Fremlæggelse - HWdel.pptx
</commit_message>
<xml_diff>
--- a/Fremlæggelse/Fremlæggelse - HWdel.pptx
+++ b/Fremlæggelse/Fremlæggelse - HWdel.pptx
@@ -16,6 +16,7 @@
     <p:sldId id="267" r:id="rId10"/>
     <p:sldId id="263" r:id="rId11"/>
     <p:sldId id="266" r:id="rId12"/>
+    <p:sldId id="268" r:id="rId13"/>
   </p:sldIdLst>
   <p:sldSz cx="12192000" cy="6858000"/>
   <p:notesSz cx="6858000" cy="9144000"/>
@@ -114,6 +115,11 @@
       </a:defRPr>
     </a:lvl9pPr>
   </p:defaultTextStyle>
+  <p:extLst>
+    <p:ext uri="{EFAFB233-063F-42B5-8137-9DF3F51BA10A}">
+      <p15:sldGuideLst xmlns:p15="http://schemas.microsoft.com/office/powerpoint/2012/main"/>
+    </p:ext>
+  </p:extLst>
 </p:presentation>
 </file>
 
@@ -3368,6 +3374,86 @@
 </p:sld>
 </file>
 
+<file path=ppt/slides/slide12.xml><?xml version="1.0" encoding="utf-8"?>
+<p:sld xmlns:a="http://schemas.openxmlformats.org/drawingml/2006/main" xmlns:r="http://schemas.openxmlformats.org/officeDocument/2006/relationships" xmlns:p="http://schemas.openxmlformats.org/presentationml/2006/main">
+  <p:cSld>
+    <p:spTree>
+      <p:nvGrpSpPr>
+        <p:cNvPr id="1" name=""/>
+        <p:cNvGrpSpPr/>
+        <p:nvPr/>
+      </p:nvGrpSpPr>
+      <p:grpSpPr>
+        <a:xfrm>
+          <a:off x="0" y="0"/>
+          <a:ext cx="0" cy="0"/>
+          <a:chOff x="0" y="0"/>
+          <a:chExt cx="0" cy="0"/>
+        </a:xfrm>
+      </p:grpSpPr>
+      <p:sp>
+        <p:nvSpPr>
+          <p:cNvPr id="2" name="Titel 1"/>
+          <p:cNvSpPr>
+            <a:spLocks noGrp="1"/>
+          </p:cNvSpPr>
+          <p:nvPr>
+            <p:ph type="title"/>
+          </p:nvPr>
+        </p:nvSpPr>
+        <p:spPr/>
+        <p:txBody>
+          <a:bodyPr/>
+          <a:lstStyle/>
+          <a:p>
+            <a:r>
+              <a:rPr lang="da-DK" dirty="0" smtClean="0"/>
+              <a:t>Evt. noget 2. ordens </a:t>
+            </a:r>
+            <a:r>
+              <a:rPr lang="da-DK" dirty="0" err="1" smtClean="0"/>
+              <a:t>højpasfilter</a:t>
+            </a:r>
+            <a:r>
+              <a:rPr lang="da-DK" dirty="0" smtClean="0"/>
+              <a:t>?</a:t>
+            </a:r>
+            <a:endParaRPr lang="da-DK" dirty="0"/>
+          </a:p>
+        </p:txBody>
+      </p:sp>
+      <p:sp>
+        <p:nvSpPr>
+          <p:cNvPr id="6" name="Pladsholder til indhold 5"/>
+          <p:cNvSpPr>
+            <a:spLocks noGrp="1"/>
+          </p:cNvSpPr>
+          <p:nvPr>
+            <p:ph idx="1"/>
+          </p:nvPr>
+        </p:nvSpPr>
+        <p:spPr/>
+        <p:txBody>
+          <a:bodyPr/>
+          <a:lstStyle/>
+          <a:p>
+            <a:endParaRPr lang="da-DK"/>
+          </a:p>
+        </p:txBody>
+      </p:sp>
+    </p:spTree>
+    <p:extLst>
+      <p:ext uri="{BB962C8B-B14F-4D97-AF65-F5344CB8AC3E}">
+        <p14:creationId xmlns:p14="http://schemas.microsoft.com/office/powerpoint/2010/main" val="3503656408"/>
+      </p:ext>
+    </p:extLst>
+  </p:cSld>
+  <p:clrMapOvr>
+    <a:masterClrMapping/>
+  </p:clrMapOvr>
+</p:sld>
+</file>
+
 <file path=ppt/slides/slide2.xml><?xml version="1.0" encoding="utf-8"?>
 <p:sld xmlns:a="http://schemas.openxmlformats.org/drawingml/2006/main" xmlns:r="http://schemas.openxmlformats.org/officeDocument/2006/relationships" xmlns:p="http://schemas.openxmlformats.org/presentationml/2006/main">
   <p:cSld>

</xml_diff>

<commit_message>
Oprettet dokument med slides / overskrifter
</commit_message>
<xml_diff>
--- a/Fremlæggelse/Fremlæggelse - HWdel.pptx
+++ b/Fremlæggelse/Fremlæggelse - HWdel.pptx
@@ -296,7 +296,7 @@
           <a:p>
             <a:fld id="{0C5E5CFE-7DCC-48C7-B7CB-67CD8A2C1B9A}" type="slidenum">
               <a:rPr lang="da-DK" smtClean="0"/>
-              <a:t>‹nr.›</a:t>
+              <a:t>‹#›</a:t>
             </a:fld>
             <a:endParaRPr lang="da-DK"/>
           </a:p>
@@ -466,7 +466,7 @@
           <a:p>
             <a:fld id="{0C5E5CFE-7DCC-48C7-B7CB-67CD8A2C1B9A}" type="slidenum">
               <a:rPr lang="da-DK" smtClean="0"/>
-              <a:t>‹nr.›</a:t>
+              <a:t>‹#›</a:t>
             </a:fld>
             <a:endParaRPr lang="da-DK"/>
           </a:p>
@@ -646,7 +646,7 @@
           <a:p>
             <a:fld id="{0C5E5CFE-7DCC-48C7-B7CB-67CD8A2C1B9A}" type="slidenum">
               <a:rPr lang="da-DK" smtClean="0"/>
-              <a:t>‹nr.›</a:t>
+              <a:t>‹#›</a:t>
             </a:fld>
             <a:endParaRPr lang="da-DK"/>
           </a:p>
@@ -816,7 +816,7 @@
           <a:p>
             <a:fld id="{0C5E5CFE-7DCC-48C7-B7CB-67CD8A2C1B9A}" type="slidenum">
               <a:rPr lang="da-DK" smtClean="0"/>
-              <a:t>‹nr.›</a:t>
+              <a:t>‹#›</a:t>
             </a:fld>
             <a:endParaRPr lang="da-DK"/>
           </a:p>
@@ -1062,7 +1062,7 @@
           <a:p>
             <a:fld id="{0C5E5CFE-7DCC-48C7-B7CB-67CD8A2C1B9A}" type="slidenum">
               <a:rPr lang="da-DK" smtClean="0"/>
-              <a:t>‹nr.›</a:t>
+              <a:t>‹#›</a:t>
             </a:fld>
             <a:endParaRPr lang="da-DK"/>
           </a:p>
@@ -1294,7 +1294,7 @@
           <a:p>
             <a:fld id="{0C5E5CFE-7DCC-48C7-B7CB-67CD8A2C1B9A}" type="slidenum">
               <a:rPr lang="da-DK" smtClean="0"/>
-              <a:t>‹nr.›</a:t>
+              <a:t>‹#›</a:t>
             </a:fld>
             <a:endParaRPr lang="da-DK"/>
           </a:p>
@@ -1661,7 +1661,7 @@
           <a:p>
             <a:fld id="{0C5E5CFE-7DCC-48C7-B7CB-67CD8A2C1B9A}" type="slidenum">
               <a:rPr lang="da-DK" smtClean="0"/>
-              <a:t>‹nr.›</a:t>
+              <a:t>‹#›</a:t>
             </a:fld>
             <a:endParaRPr lang="da-DK"/>
           </a:p>
@@ -1779,7 +1779,7 @@
           <a:p>
             <a:fld id="{0C5E5CFE-7DCC-48C7-B7CB-67CD8A2C1B9A}" type="slidenum">
               <a:rPr lang="da-DK" smtClean="0"/>
-              <a:t>‹nr.›</a:t>
+              <a:t>‹#›</a:t>
             </a:fld>
             <a:endParaRPr lang="da-DK"/>
           </a:p>
@@ -1874,7 +1874,7 @@
           <a:p>
             <a:fld id="{0C5E5CFE-7DCC-48C7-B7CB-67CD8A2C1B9A}" type="slidenum">
               <a:rPr lang="da-DK" smtClean="0"/>
-              <a:t>‹nr.›</a:t>
+              <a:t>‹#›</a:t>
             </a:fld>
             <a:endParaRPr lang="da-DK"/>
           </a:p>
@@ -2151,7 +2151,7 @@
           <a:p>
             <a:fld id="{0C5E5CFE-7DCC-48C7-B7CB-67CD8A2C1B9A}" type="slidenum">
               <a:rPr lang="da-DK" smtClean="0"/>
-              <a:t>‹nr.›</a:t>
+              <a:t>‹#›</a:t>
             </a:fld>
             <a:endParaRPr lang="da-DK"/>
           </a:p>
@@ -2404,7 +2404,7 @@
           <a:p>
             <a:fld id="{0C5E5CFE-7DCC-48C7-B7CB-67CD8A2C1B9A}" type="slidenum">
               <a:rPr lang="da-DK" smtClean="0"/>
-              <a:t>‹nr.›</a:t>
+              <a:t>‹#›</a:t>
             </a:fld>
             <a:endParaRPr lang="da-DK"/>
           </a:p>
@@ -2653,7 +2653,7 @@
           <a:p>
             <a:fld id="{0C5E5CFE-7DCC-48C7-B7CB-67CD8A2C1B9A}" type="slidenum">
               <a:rPr lang="da-DK" smtClean="0"/>
-              <a:t>‹nr.›</a:t>
+              <a:t>‹#›</a:t>
             </a:fld>
             <a:endParaRPr lang="da-DK"/>
           </a:p>
@@ -3059,6 +3059,13 @@
   <p:clrMapOvr>
     <a:masterClrMapping/>
   </p:clrMapOvr>
+  <p:timing>
+    <p:tnLst>
+      <p:par>
+        <p:cTn id="1" dur="indefinite" restart="never" nodeType="tmRoot"/>
+      </p:par>
+    </p:tnLst>
+  </p:timing>
 </p:sld>
 </file>
 
@@ -3206,6 +3213,13 @@
   <p:clrMapOvr>
     <a:masterClrMapping/>
   </p:clrMapOvr>
+  <p:timing>
+    <p:tnLst>
+      <p:par>
+        <p:cTn id="1" dur="indefinite" restart="never" nodeType="tmRoot"/>
+      </p:par>
+    </p:tnLst>
+  </p:timing>
 </p:sld>
 </file>
 
@@ -3371,6 +3385,13 @@
   <p:clrMapOvr>
     <a:masterClrMapping/>
   </p:clrMapOvr>
+  <p:timing>
+    <p:tnLst>
+      <p:par>
+        <p:cTn id="1" dur="indefinite" restart="never" nodeType="tmRoot"/>
+      </p:par>
+    </p:tnLst>
+  </p:timing>
 </p:sld>
 </file>
 
@@ -3451,6 +3472,13 @@
   <p:clrMapOvr>
     <a:masterClrMapping/>
   </p:clrMapOvr>
+  <p:timing>
+    <p:tnLst>
+      <p:par>
+        <p:cTn id="1" dur="indefinite" restart="never" nodeType="tmRoot"/>
+      </p:par>
+    </p:tnLst>
+  </p:timing>
 </p:sld>
 </file>
 
@@ -3530,6 +3558,13 @@
   <p:clrMapOvr>
     <a:masterClrMapping/>
   </p:clrMapOvr>
+  <p:timing>
+    <p:tnLst>
+      <p:par>
+        <p:cTn id="1" dur="indefinite" restart="never" nodeType="tmRoot"/>
+      </p:par>
+    </p:tnLst>
+  </p:timing>
 </p:sld>
 </file>
 
@@ -3613,6 +3648,13 @@
   <p:clrMapOvr>
     <a:masterClrMapping/>
   </p:clrMapOvr>
+  <p:timing>
+    <p:tnLst>
+      <p:par>
+        <p:cTn id="1" dur="indefinite" restart="never" nodeType="tmRoot"/>
+      </p:par>
+    </p:tnLst>
+  </p:timing>
 </p:sld>
 </file>
 
@@ -3681,6 +3723,13 @@
   <p:clrMapOvr>
     <a:masterClrMapping/>
   </p:clrMapOvr>
+  <p:timing>
+    <p:tnLst>
+      <p:par>
+        <p:cTn id="1" dur="indefinite" restart="never" nodeType="tmRoot"/>
+      </p:par>
+    </p:tnLst>
+  </p:timing>
 </p:sld>
 </file>
 
@@ -3785,6 +3834,13 @@
   <p:clrMapOvr>
     <a:masterClrMapping/>
   </p:clrMapOvr>
+  <p:timing>
+    <p:tnLst>
+      <p:par>
+        <p:cTn id="1" dur="indefinite" restart="never" nodeType="tmRoot"/>
+      </p:par>
+    </p:tnLst>
+  </p:timing>
 </p:sld>
 </file>
 
@@ -3864,6 +3920,13 @@
   <p:clrMapOvr>
     <a:masterClrMapping/>
   </p:clrMapOvr>
+  <p:timing>
+    <p:tnLst>
+      <p:par>
+        <p:cTn id="1" dur="indefinite" restart="never" nodeType="tmRoot"/>
+      </p:par>
+    </p:tnLst>
+  </p:timing>
 </p:sld>
 </file>
 
@@ -3973,6 +4036,13 @@
   <p:clrMapOvr>
     <a:masterClrMapping/>
   </p:clrMapOvr>
+  <p:timing>
+    <p:tnLst>
+      <p:par>
+        <p:cTn id="1" dur="indefinite" restart="never" nodeType="tmRoot"/>
+      </p:par>
+    </p:tnLst>
+  </p:timing>
 </p:sld>
 </file>
 
@@ -4115,6 +4185,13 @@
   <p:clrMapOvr>
     <a:masterClrMapping/>
   </p:clrMapOvr>
+  <p:timing>
+    <p:tnLst>
+      <p:par>
+        <p:cTn id="1" dur="indefinite" restart="never" nodeType="tmRoot"/>
+      </p:par>
+    </p:tnLst>
+  </p:timing>
 </p:sld>
 </file>
 
@@ -4194,6 +4271,13 @@
   <p:clrMapOvr>
     <a:masterClrMapping/>
   </p:clrMapOvr>
+  <p:timing>
+    <p:tnLst>
+      <p:par>
+        <p:cTn id="1" dur="indefinite" restart="never" nodeType="tmRoot"/>
+      </p:par>
+    </p:tnLst>
+  </p:timing>
 </p:sld>
 </file>
 

</xml_diff>